<commit_message>
improve grammar in the presentation
</commit_message>
<xml_diff>
--- a/ArcFace Saad.pptx
+++ b/ArcFace Saad.pptx
@@ -3813,8 +3813,13 @@
           <a:p>
             <a:r>
               <a:rPr lang="en-US" dirty="0"/>
-              <a:t>The validation loss goes down but it should probably decrease more</a:t>
-            </a:r>
+              <a:t>The validation loss goes down but it should probably decrease </a:t>
+            </a:r>
+            <a:r>
+              <a:rPr lang="en-US" dirty="0" smtClean="0"/>
+              <a:t>more.</a:t>
+            </a:r>
+            <a:endParaRPr lang="en-US" dirty="0"/>
           </a:p>
         </p:txBody>
       </p:sp>
@@ -4143,8 +4148,13 @@
           <a:p>
             <a:r>
               <a:rPr lang="en-US" dirty="0"/>
-              <a:t>After handling class imbalance, the validation loss starts to decrease </a:t>
-            </a:r>
+              <a:t>After handling class imbalance, the validation loss starts to </a:t>
+            </a:r>
+            <a:r>
+              <a:rPr lang="en-US" dirty="0" smtClean="0"/>
+              <a:t>decrease. </a:t>
+            </a:r>
+            <a:endParaRPr lang="en-US" dirty="0"/>
           </a:p>
         </p:txBody>
       </p:sp>
@@ -5204,7 +5214,7 @@
         <p:spPr>
           <a:xfrm>
             <a:off x="491613" y="1455174"/>
-            <a:ext cx="10697497" cy="2814617"/>
+            <a:ext cx="10697497" cy="2862322"/>
           </a:xfrm>
           <a:prstGeom prst="rect">
             <a:avLst/>
@@ -5226,8 +5236,13 @@
             </a:pPr>
             <a:r>
               <a:rPr lang="en-US" sz="2000" dirty="0"/>
-              <a:t>During inference, we only take the feature embedding without the last fully connected layer</a:t>
-            </a:r>
+              <a:t>During inference, we only take the feature embedding without the last fully connected </a:t>
+            </a:r>
+            <a:r>
+              <a:rPr lang="en-US" sz="2000" dirty="0" smtClean="0"/>
+              <a:t>layer.</a:t>
+            </a:r>
+            <a:endParaRPr lang="en-US" sz="2000" dirty="0"/>
           </a:p>
           <a:p>
             <a:pPr marL="285750" indent="-285750">
@@ -5239,8 +5254,13 @@
             </a:pPr>
             <a:r>
               <a:rPr lang="en-US" sz="2000" dirty="0"/>
-              <a:t>That means we take the 512 Dimensional Feature Embedding as output</a:t>
-            </a:r>
+              <a:t>That means we take the 512 Dimensional Feature Embedding as </a:t>
+            </a:r>
+            <a:r>
+              <a:rPr lang="en-US" sz="2000" dirty="0" smtClean="0"/>
+              <a:t>output.</a:t>
+            </a:r>
+            <a:endParaRPr lang="en-US" sz="2000" dirty="0"/>
           </a:p>
           <a:p>
             <a:pPr marL="285750" indent="-285750">
@@ -5260,8 +5280,13 @@
             </a:r>
             <a:r>
               <a:rPr lang="en-US" sz="2000" dirty="0"/>
-              <a:t> Layer</a:t>
-            </a:r>
+              <a:t> </a:t>
+            </a:r>
+            <a:r>
+              <a:rPr lang="en-US" sz="2000" dirty="0" smtClean="0"/>
+              <a:t>Layer.</a:t>
+            </a:r>
+            <a:endParaRPr lang="en-US" sz="2000" dirty="0"/>
           </a:p>
           <a:p>
             <a:pPr marL="285750" indent="-285750">
@@ -5281,8 +5306,13 @@
             </a:r>
             <a:r>
               <a:rPr lang="en-US" sz="2000" dirty="0"/>
-              <a:t> Layer corresponds to a class centroid</a:t>
-            </a:r>
+              <a:t> Layer corresponds to a class </a:t>
+            </a:r>
+            <a:r>
+              <a:rPr lang="en-US" sz="2000" dirty="0" smtClean="0"/>
+              <a:t>centroid.</a:t>
+            </a:r>
+            <a:endParaRPr lang="en-US" sz="2000" dirty="0"/>
           </a:p>
           <a:p>
             <a:pPr marL="285750" indent="-285750">
@@ -5294,8 +5324,13 @@
             </a:pPr>
             <a:r>
               <a:rPr lang="en-US" sz="2000" dirty="0"/>
-              <a:t>Choose the index of the class weight with the maximum cosine similarity </a:t>
-            </a:r>
+              <a:t>Choose the index of the class weight with the maximum cosine </a:t>
+            </a:r>
+            <a:r>
+              <a:rPr lang="en-US" sz="2000" dirty="0" smtClean="0"/>
+              <a:t>similarity.</a:t>
+            </a:r>
+            <a:endParaRPr lang="en-US" sz="2000" dirty="0"/>
           </a:p>
         </p:txBody>
       </p:sp>
@@ -5408,8 +5443,13 @@
             </a:pPr>
             <a:r>
               <a:rPr lang="en-US" sz="2000" dirty="0"/>
-              <a:t>The primary task is to implement Additive Angular Margin Loss for Deep Face Recognition</a:t>
-            </a:r>
+              <a:t>The primary task is to implement Additive Angular Margin Loss for Deep Face </a:t>
+            </a:r>
+            <a:r>
+              <a:rPr lang="en-US" sz="2000" dirty="0" smtClean="0"/>
+              <a:t>Recognition.</a:t>
+            </a:r>
+            <a:endParaRPr lang="en-US" sz="2000" dirty="0"/>
           </a:p>
           <a:p>
             <a:pPr marL="285750" indent="-285750">
@@ -5421,8 +5461,13 @@
             </a:pPr>
             <a:r>
               <a:rPr lang="en-US" sz="2000" dirty="0"/>
-              <a:t>The given dataset contains 155 images only from LFW Dataset</a:t>
-            </a:r>
+              <a:t>The given dataset contains 155 images only from LFW </a:t>
+            </a:r>
+            <a:r>
+              <a:rPr lang="en-US" sz="2000" dirty="0" smtClean="0"/>
+              <a:t>Dataset.</a:t>
+            </a:r>
+            <a:endParaRPr lang="en-US" sz="2000" dirty="0"/>
           </a:p>
           <a:p>
             <a:pPr marL="285750" indent="-285750">
@@ -5442,8 +5487,13 @@
             </a:r>
             <a:r>
               <a:rPr lang="en-US" sz="2000" dirty="0"/>
-              <a:t> loss</a:t>
-            </a:r>
+              <a:t> </a:t>
+            </a:r>
+            <a:r>
+              <a:rPr lang="en-US" sz="2000" dirty="0" smtClean="0"/>
+              <a:t>loss.</a:t>
+            </a:r>
+            <a:endParaRPr lang="en-US" sz="2000" dirty="0"/>
           </a:p>
           <a:p>
             <a:pPr marL="285750" indent="-285750">
@@ -5455,8 +5505,13 @@
             </a:pPr>
             <a:r>
               <a:rPr lang="en-US" sz="2000" dirty="0"/>
-              <a:t>Intuitively, embeddings of the same face should be mapped close to each other and embeddings of different faces should be more apart from each other</a:t>
-            </a:r>
+              <a:t>Intuitively, embeddings of the same face should be mapped close to each other and embeddings of different faces should be more apart from each </a:t>
+            </a:r>
+            <a:r>
+              <a:rPr lang="en-US" sz="2000" dirty="0" smtClean="0"/>
+              <a:t>other.</a:t>
+            </a:r>
+            <a:endParaRPr lang="en-US" sz="2000" dirty="0"/>
           </a:p>
           <a:p>
             <a:pPr marL="285750" indent="-285750">
@@ -5468,8 +5523,13 @@
             </a:pPr>
             <a:r>
               <a:rPr lang="en-US" sz="2000" dirty="0"/>
-              <a:t>This means that the projected faces should have small intra-class variance and large inter-class variance</a:t>
-            </a:r>
+              <a:t>This means that the projected faces should have small intra-class variance and large inter-class </a:t>
+            </a:r>
+            <a:r>
+              <a:rPr lang="en-US" sz="2000" dirty="0" smtClean="0"/>
+              <a:t>variance.</a:t>
+            </a:r>
+            <a:endParaRPr lang="en-US" sz="2000" dirty="0"/>
           </a:p>
           <a:p>
             <a:pPr marL="285750" indent="-285750">
@@ -5489,8 +5549,13 @@
             </a:r>
             <a:r>
               <a:rPr lang="en-US" sz="2000" dirty="0"/>
-              <a:t> loss does not explicitly optimize the feature embeddings to enforce higher similarity for intra class samples and diversity for inter-class samples </a:t>
-            </a:r>
+              <a:t> loss does not explicitly optimize the feature embeddings to enforce higher similarity for intra class samples and diversity for inter-class </a:t>
+            </a:r>
+            <a:r>
+              <a:rPr lang="en-US" sz="2000" dirty="0" smtClean="0"/>
+              <a:t>samples.</a:t>
+            </a:r>
+            <a:endParaRPr lang="en-US" sz="2000" dirty="0"/>
           </a:p>
           <a:p>
             <a:pPr marL="285750" indent="-285750">
@@ -5502,8 +5567,13 @@
             </a:pPr>
             <a:r>
               <a:rPr lang="en-US" sz="2000" dirty="0"/>
-              <a:t>Drawback: Performance drop under large intra-class appearance variations (e.g. pose variations, age gaps)</a:t>
-            </a:r>
+              <a:t>Drawback: Performance drop under large intra-class appearance variations (e.g. pose variations, age gaps</a:t>
+            </a:r>
+            <a:r>
+              <a:rPr lang="en-US" sz="2000" dirty="0" smtClean="0"/>
+              <a:t>).</a:t>
+            </a:r>
+            <a:endParaRPr lang="en-US" sz="2000" dirty="0"/>
           </a:p>
           <a:p>
             <a:pPr>
@@ -5612,7 +5682,7 @@
         <p:spPr>
           <a:xfrm>
             <a:off x="442452" y="1484671"/>
-            <a:ext cx="11484077" cy="3737946"/>
+            <a:ext cx="11484077" cy="3785652"/>
           </a:xfrm>
           <a:prstGeom prst="rect">
             <a:avLst/>
@@ -5634,8 +5704,13 @@
             </a:pPr>
             <a:r>
               <a:rPr lang="en-US" sz="2000" dirty="0"/>
-              <a:t>With traditional losses, we need to retrain the whole model for adding an unknown class</a:t>
-            </a:r>
+              <a:t>With traditional losses, we need to retrain the whole model for adding an unknown </a:t>
+            </a:r>
+            <a:r>
+              <a:rPr lang="en-US" sz="2000" dirty="0" smtClean="0"/>
+              <a:t>class.</a:t>
+            </a:r>
+            <a:endParaRPr lang="en-US" sz="2000" dirty="0"/>
           </a:p>
           <a:p>
             <a:pPr marL="285750" indent="-285750">
@@ -5663,8 +5738,13 @@
             </a:r>
             <a:r>
               <a:rPr lang="en-US" sz="2000" dirty="0"/>
-              <a:t>retraining the whole network</a:t>
-            </a:r>
+              <a:t>retraining the whole </a:t>
+            </a:r>
+            <a:r>
+              <a:rPr lang="en-US" sz="2000" dirty="0" smtClean="0"/>
+              <a:t>network.</a:t>
+            </a:r>
+            <a:endParaRPr lang="en-US" sz="2000" dirty="0"/>
           </a:p>
           <a:p>
             <a:pPr marL="285750" indent="-285750">
@@ -5676,8 +5756,13 @@
             </a:pPr>
             <a:r>
               <a:rPr lang="en-US" sz="2000" dirty="0"/>
-              <a:t>Let us say we have 100 new images belong to an unknown class A</a:t>
-            </a:r>
+              <a:t>Let us say we have 100 new images belong to an unknown class </a:t>
+            </a:r>
+            <a:r>
+              <a:rPr lang="en-US" sz="2000" dirty="0" smtClean="0"/>
+              <a:t>A.</a:t>
+            </a:r>
+            <a:endParaRPr lang="en-US" sz="2000" dirty="0"/>
           </a:p>
           <a:p>
             <a:pPr marL="285750" indent="-285750">
@@ -5689,8 +5774,13 @@
             </a:pPr>
             <a:r>
               <a:rPr lang="en-US" sz="2000" dirty="0"/>
-              <a:t>We use multiple forward passes to compute the feature embeddings for each new image</a:t>
-            </a:r>
+              <a:t>We use multiple forward passes to compute the feature embeddings for each new </a:t>
+            </a:r>
+            <a:r>
+              <a:rPr lang="en-US" sz="2000" dirty="0" smtClean="0"/>
+              <a:t>image.</a:t>
+            </a:r>
+            <a:endParaRPr lang="en-US" sz="2000" dirty="0"/>
           </a:p>
           <a:p>
             <a:pPr marL="285750" indent="-285750">
@@ -5702,8 +5792,13 @@
             </a:pPr>
             <a:r>
               <a:rPr lang="en-US" sz="2000" dirty="0"/>
-              <a:t>Then we can take the mean of the feature embeddings, which will approximate new class centroid</a:t>
-            </a:r>
+              <a:t>Then we can take the mean of the feature embeddings, which will approximate new class </a:t>
+            </a:r>
+            <a:r>
+              <a:rPr lang="en-US" sz="2000" dirty="0" smtClean="0"/>
+              <a:t>centroid.</a:t>
+            </a:r>
+            <a:endParaRPr lang="en-US" sz="2000" dirty="0"/>
           </a:p>
           <a:p>
             <a:pPr marL="285750" indent="-285750">
@@ -5723,8 +5818,13 @@
             </a:r>
             <a:r>
               <a:rPr lang="en-US" sz="2000" dirty="0"/>
-              <a:t> Layer</a:t>
-            </a:r>
+              <a:t> </a:t>
+            </a:r>
+            <a:r>
+              <a:rPr lang="en-US" sz="2000" dirty="0" smtClean="0"/>
+              <a:t>Layer.</a:t>
+            </a:r>
+            <a:endParaRPr lang="en-US" sz="2000" dirty="0"/>
           </a:p>
           <a:p>
             <a:pPr marL="285750" indent="-285750">
@@ -5857,8 +5957,13 @@
             </a:pPr>
             <a:r>
               <a:rPr lang="en-US" sz="2000" dirty="0"/>
-              <a:t>Create and train a simple model from scratch</a:t>
-            </a:r>
+              <a:t>Create and train a simple model from </a:t>
+            </a:r>
+            <a:r>
+              <a:rPr lang="en-US" sz="2000" dirty="0" smtClean="0"/>
+              <a:t>scratch.</a:t>
+            </a:r>
+            <a:endParaRPr lang="en-US" sz="2000" dirty="0"/>
           </a:p>
           <a:p>
             <a:pPr marL="285750" indent="-285750">
@@ -5870,8 +5975,13 @@
             </a:pPr>
             <a:r>
               <a:rPr lang="en-US" sz="2000" dirty="0"/>
-              <a:t>Fewer parameters, less chances of overfitting</a:t>
-            </a:r>
+              <a:t>Fewer parameters, less chances of </a:t>
+            </a:r>
+            <a:r>
+              <a:rPr lang="en-US" sz="2000" dirty="0" smtClean="0"/>
+              <a:t>overfitting.</a:t>
+            </a:r>
+            <a:endParaRPr lang="en-US" sz="2000" dirty="0"/>
           </a:p>
           <a:p>
             <a:pPr marL="285750" indent="-285750">
@@ -5891,21 +6001,21 @@
             </a:r>
             <a:r>
               <a:rPr lang="en-US" sz="2000" dirty="0"/>
-              <a:t> 50 model (Do not freeze weights)</a:t>
-            </a:r>
-          </a:p>
-          <a:p>
-            <a:pPr marL="285750" indent="-285750">
+              <a:t> 50 model (Do not freeze weights</a:t>
+            </a:r>
+            <a:r>
+              <a:rPr lang="en-US" sz="2000" dirty="0" smtClean="0"/>
+              <a:t>).</a:t>
+            </a:r>
+            <a:endParaRPr lang="en-US" sz="2000" dirty="0"/>
+          </a:p>
+          <a:p>
+            <a:pPr>
               <a:lnSpc>
                 <a:spcPct val="150000"/>
               </a:lnSpc>
-              <a:buFont typeface="Arial" panose="020B0604020202020204" pitchFamily="34" charset="0"/>
-              <a:buChar char="•"/>
             </a:pPr>
-            <a:r>
-              <a:rPr lang="en-US" sz="2000" dirty="0"/>
-              <a:t>Check implementation on MNIST Dataset</a:t>
-            </a:r>
+            <a:endParaRPr lang="en-US" sz="2000" dirty="0"/>
           </a:p>
           <a:p>
             <a:pPr marL="285750" indent="-285750">
@@ -5997,7 +6107,7 @@
             </a:r>
             <a:r>
               <a:rPr lang="en-US" sz="4800" b="1" smtClean="0"/>
-              <a:t>Reading!</a:t>
+              <a:t>Listening!</a:t>
             </a:r>
             <a:endParaRPr lang="en-US" sz="4800" b="1" dirty="0"/>
           </a:p>
@@ -6294,8 +6404,13 @@
             </a:r>
             <a:r>
               <a:rPr lang="en-US" sz="2000" dirty="0"/>
-              <a:t> Loss, respectively</a:t>
-            </a:r>
+              <a:t> Loss, </a:t>
+            </a:r>
+            <a:r>
+              <a:rPr lang="en-US" sz="2000" dirty="0" smtClean="0"/>
+              <a:t>respectively.</a:t>
+            </a:r>
+            <a:endParaRPr lang="en-US" sz="2000" dirty="0"/>
           </a:p>
         </p:txBody>
       </p:sp>
@@ -6566,8 +6681,13 @@
             </a:pPr>
             <a:r>
               <a:rPr lang="en-US" sz="2000" dirty="0"/>
-              <a:t>We have 155 RGB images with dimension of 250 X250X3 </a:t>
-            </a:r>
+              <a:t>We have 155 RGB images with dimension of 250 </a:t>
+            </a:r>
+            <a:r>
+              <a:rPr lang="en-US" sz="2000" dirty="0" smtClean="0"/>
+              <a:t>X250X3.</a:t>
+            </a:r>
+            <a:endParaRPr lang="en-US" sz="2000" dirty="0"/>
           </a:p>
           <a:p>
             <a:pPr marL="285750" indent="-285750">
@@ -6579,8 +6699,13 @@
             </a:pPr>
             <a:r>
               <a:rPr lang="en-US" sz="2000" dirty="0"/>
-              <a:t>18 classes (face categories)</a:t>
-            </a:r>
+              <a:t>18 classes (face categories</a:t>
+            </a:r>
+            <a:r>
+              <a:rPr lang="en-US" sz="2000" dirty="0" smtClean="0"/>
+              <a:t>).</a:t>
+            </a:r>
+            <a:endParaRPr lang="en-US" sz="2000" dirty="0"/>
           </a:p>
           <a:p>
             <a:pPr marL="285750" indent="-285750">
@@ -6600,8 +6725,13 @@
             </a:r>
             <a:r>
               <a:rPr lang="en-US" sz="2000" dirty="0"/>
-              <a:t>”: 9}</a:t>
-            </a:r>
+              <a:t>”: 9</a:t>
+            </a:r>
+            <a:r>
+              <a:rPr lang="en-US" sz="2000" dirty="0" smtClean="0"/>
+              <a:t>}.</a:t>
+            </a:r>
+            <a:endParaRPr lang="en-US" sz="2000" dirty="0"/>
           </a:p>
           <a:p>
             <a:pPr marL="285750" indent="-285750">
@@ -6626,8 +6756,13 @@
             </a:pPr>
             <a:r>
               <a:rPr lang="en-US" sz="2000" dirty="0"/>
-              <a:t>I scale the features(pixels) to lie in the range of [0, 1]</a:t>
-            </a:r>
+              <a:t>I scale the features(pixels) to lie in the range of [0, 1</a:t>
+            </a:r>
+            <a:r>
+              <a:rPr lang="en-US" sz="2000" dirty="0" smtClean="0"/>
+              <a:t>].</a:t>
+            </a:r>
+            <a:endParaRPr lang="en-US" sz="2000" dirty="0"/>
           </a:p>
           <a:p>
             <a:pPr marL="285750" indent="-285750">
@@ -6639,8 +6774,13 @@
             </a:pPr>
             <a:r>
               <a:rPr lang="en-US" sz="2000" dirty="0"/>
-              <a:t>Due to small dataset, I only have the training set and validation set</a:t>
-            </a:r>
+              <a:t>Due to small dataset, I only have the training set and validation </a:t>
+            </a:r>
+            <a:r>
+              <a:rPr lang="en-US" sz="2000" dirty="0" smtClean="0"/>
+              <a:t>set.</a:t>
+            </a:r>
+            <a:endParaRPr lang="en-US" sz="2000" dirty="0"/>
           </a:p>
           <a:p>
             <a:pPr marL="285750" indent="-285750">
@@ -6652,8 +6792,13 @@
             </a:pPr>
             <a:r>
               <a:rPr lang="en-US" sz="2000" dirty="0"/>
-              <a:t>I use a train-validation split of 70% and 30%</a:t>
-            </a:r>
+              <a:t>I use a train-validation split of 70% and 30</a:t>
+            </a:r>
+            <a:r>
+              <a:rPr lang="en-US" sz="2000" dirty="0" smtClean="0"/>
+              <a:t>%.</a:t>
+            </a:r>
+            <a:endParaRPr lang="en-US" sz="2000" dirty="0"/>
           </a:p>
           <a:p>
             <a:pPr marL="285750" indent="-285750">
@@ -6665,8 +6810,13 @@
             </a:pPr>
             <a:r>
               <a:rPr lang="en-US" sz="2000" dirty="0"/>
-              <a:t>I create the train-validation split in a stratified fashion so that the validation set contains roughly 30% of images from each class</a:t>
-            </a:r>
+              <a:t>I create the train-validation split in a stratified fashion so that the validation set contains roughly 30% of images from each </a:t>
+            </a:r>
+            <a:r>
+              <a:rPr lang="en-US" sz="2000" dirty="0" smtClean="0"/>
+              <a:t>class.</a:t>
+            </a:r>
+            <a:endParaRPr lang="en-US" sz="2000" dirty="0"/>
           </a:p>
           <a:p>
             <a:pPr marL="285750" indent="-285750">
@@ -6777,7 +6927,7 @@
         <p:spPr>
           <a:xfrm>
             <a:off x="208935" y="1170040"/>
-            <a:ext cx="11326762" cy="4199611"/>
+            <a:ext cx="11326762" cy="4247317"/>
           </a:xfrm>
           <a:prstGeom prst="rect">
             <a:avLst/>
@@ -6815,8 +6965,13 @@
             </a:r>
             <a:r>
               <a:rPr lang="en-US" sz="2000" dirty="0"/>
-              <a:t> 100 models for feature extraction</a:t>
-            </a:r>
+              <a:t> 100 models for feature </a:t>
+            </a:r>
+            <a:r>
+              <a:rPr lang="en-US" sz="2000" dirty="0" smtClean="0"/>
+              <a:t>extraction.</a:t>
+            </a:r>
+            <a:endParaRPr lang="en-US" sz="2000" dirty="0"/>
           </a:p>
           <a:p>
             <a:pPr marL="285750" indent="-285750">
@@ -6836,8 +6991,13 @@
             </a:r>
             <a:r>
               <a:rPr lang="en-US" sz="2000" dirty="0"/>
-              <a:t>-Fully Connected and Batch Norm to get a 512 Dimensional Feature Embedding</a:t>
-            </a:r>
+              <a:t>-Fully Connected and Batch Norm to get a 512 Dimensional Feature </a:t>
+            </a:r>
+            <a:r>
+              <a:rPr lang="en-US" sz="2000" dirty="0" smtClean="0"/>
+              <a:t>Embedding.</a:t>
+            </a:r>
+            <a:endParaRPr lang="en-US" sz="2000" dirty="0"/>
           </a:p>
           <a:p>
             <a:pPr marL="285750" indent="-285750">
@@ -6857,8 +7017,13 @@
             </a:r>
             <a:r>
               <a:rPr lang="en-US" sz="2000" dirty="0"/>
-              <a:t> 50 model on ImageNet for Feature Extraction</a:t>
-            </a:r>
+              <a:t> 50 model on ImageNet for Feature </a:t>
+            </a:r>
+            <a:r>
+              <a:rPr lang="en-US" sz="2000" dirty="0" smtClean="0"/>
+              <a:t>Extraction.</a:t>
+            </a:r>
+            <a:endParaRPr lang="en-US" sz="2000" dirty="0"/>
           </a:p>
           <a:p>
             <a:pPr marL="285750" indent="-285750">
@@ -6870,8 +7035,13 @@
             </a:pPr>
             <a:r>
               <a:rPr lang="en-US" sz="2000" dirty="0"/>
-              <a:t>Then I used a Linear Layer to map the 2048 features into 512-D embedding </a:t>
-            </a:r>
+              <a:t>Then I used a Linear Layer to map the 2048 features into 512-D </a:t>
+            </a:r>
+            <a:r>
+              <a:rPr lang="en-US" sz="2000" dirty="0" smtClean="0"/>
+              <a:t>embedding.</a:t>
+            </a:r>
+            <a:endParaRPr lang="en-US" sz="2000" dirty="0"/>
           </a:p>
           <a:p>
             <a:pPr marL="285750" indent="-285750">
@@ -7009,11 +7179,7 @@
             </a:r>
             <a:r>
               <a:rPr lang="en-US" sz="2000" dirty="0" smtClean="0"/>
-              <a:t>extract the logits </a:t>
-            </a:r>
-            <a:r>
-              <a:rPr lang="en-US" sz="2000" dirty="0" smtClean="0"/>
-              <a:t>through </a:t>
+              <a:t>extract the logits through </a:t>
             </a:r>
             <a:r>
               <a:rPr lang="en-US" sz="2000" dirty="0" err="1"/>
@@ -7234,8 +7400,13 @@
             </a:r>
             <a:r>
               <a:rPr lang="en-US" sz="2000" dirty="0"/>
-              <a:t> 50 over ImageNet</a:t>
-            </a:r>
+              <a:t> 50 over </a:t>
+            </a:r>
+            <a:r>
+              <a:rPr lang="en-US" sz="2000" dirty="0" smtClean="0"/>
+              <a:t>ImageNet.</a:t>
+            </a:r>
+            <a:endParaRPr lang="en-US" sz="2000" dirty="0"/>
           </a:p>
           <a:p>
             <a:pPr marL="285750" indent="-285750">
@@ -7244,8 +7415,17 @@
             </a:pPr>
             <a:r>
               <a:rPr lang="en-US" sz="2000" dirty="0"/>
-              <a:t>I use Random Horizontal Flip as a Data Augmentation Method in Training Images</a:t>
-            </a:r>
+              <a:t>I use Random Horizontal Flip as a Data Augmentation Method in </a:t>
+            </a:r>
+            <a:r>
+              <a:rPr lang="en-US" sz="2000" dirty="0" smtClean="0"/>
+              <a:t>the training set</a:t>
+            </a:r>
+            <a:r>
+              <a:rPr lang="en-US" sz="2000" dirty="0" smtClean="0"/>
+              <a:t>.</a:t>
+            </a:r>
+            <a:endParaRPr lang="en-US" sz="2000" dirty="0"/>
           </a:p>
           <a:p>
             <a:pPr marL="285750" indent="-285750">

</xml_diff>